<commit_message>
add instructions for running sections
</commit_message>
<xml_diff>
--- a/introduction_matlabObjectOrientedProgramming.pptx
+++ b/introduction_matlabObjectOrientedProgramming.pptx
@@ -7,10 +7,10 @@
     <p:sldMasterId id="2147483701" r:id="rId3"/>
   </p:sldMasterIdLst>
   <p:notesMasterIdLst>
-    <p:notesMasterId r:id="rId11"/>
+    <p:notesMasterId r:id="rId14"/>
   </p:notesMasterIdLst>
   <p:handoutMasterIdLst>
-    <p:handoutMasterId r:id="rId12"/>
+    <p:handoutMasterId r:id="rId15"/>
   </p:handoutMasterIdLst>
   <p:sldIdLst>
     <p:sldId id="258" r:id="rId4"/>
@@ -18,8 +18,11 @@
     <p:sldId id="259" r:id="rId6"/>
     <p:sldId id="261" r:id="rId7"/>
     <p:sldId id="260" r:id="rId8"/>
-    <p:sldId id="262" r:id="rId9"/>
-    <p:sldId id="263" r:id="rId10"/>
+    <p:sldId id="264" r:id="rId9"/>
+    <p:sldId id="262" r:id="rId10"/>
+    <p:sldId id="266" r:id="rId11"/>
+    <p:sldId id="263" r:id="rId12"/>
+    <p:sldId id="267" r:id="rId13"/>
   </p:sldIdLst>
   <p:sldSz cx="12192000" cy="6858000"/>
   <p:notesSz cx="6858000" cy="9144000"/>
@@ -186,7 +189,7 @@
           <a:p>
             <a:fld id="{92ABB2FB-6345-45FF-A90E-A01D6AFF79C4}" type="datetimeFigureOut">
               <a:rPr lang="en-US" smtClean="0"/>
-              <a:t>12/19/18</a:t>
+              <a:t>12/20/18</a:t>
             </a:fld>
             <a:endParaRPr lang="en-US"/>
           </a:p>
@@ -363,7 +366,7 @@
           <a:p>
             <a:fld id="{DCC6978D-169D-4110-A16B-2595AC07B6B0}" type="datetimeFigureOut">
               <a:rPr lang="en-US" smtClean="0"/>
-              <a:t>12/19/18</a:t>
+              <a:t>12/20/18</a:t>
             </a:fld>
             <a:endParaRPr lang="en-US"/>
           </a:p>
@@ -5742,14 +5745,14 @@
           </a:ln>
           <a:extLst>
             <a:ext uri="{909E8E84-426E-40dd-AFC4-6F175D3DCCD1}">
-              <a14:hiddenFill xmlns:a14="http://schemas.microsoft.com/office/drawing/2010/main" xmlns="">
+              <a14:hiddenFill xmlns="" xmlns:a14="http://schemas.microsoft.com/office/drawing/2010/main">
                 <a:solidFill>
                   <a:srgbClr val="FFFFFF"/>
                 </a:solidFill>
               </a14:hiddenFill>
             </a:ext>
             <a:ext uri="{91240B29-F687-4f45-9708-019B960494DF}">
-              <a14:hiddenLine xmlns:a14="http://schemas.microsoft.com/office/drawing/2010/main" xmlns="" w="9525">
+              <a14:hiddenLine xmlns="" xmlns:a14="http://schemas.microsoft.com/office/drawing/2010/main" w="9525">
                 <a:solidFill>
                   <a:srgbClr val="000000"/>
                 </a:solidFill>
@@ -8352,14 +8355,14 @@
           </a:ln>
           <a:extLst>
             <a:ext uri="{909E8E84-426E-40dd-AFC4-6F175D3DCCD1}">
-              <a14:hiddenFill xmlns:a14="http://schemas.microsoft.com/office/drawing/2010/main" xmlns="">
+              <a14:hiddenFill xmlns="" xmlns:a14="http://schemas.microsoft.com/office/drawing/2010/main">
                 <a:solidFill>
                   <a:srgbClr val="FFFFFF"/>
                 </a:solidFill>
               </a14:hiddenFill>
             </a:ext>
             <a:ext uri="{91240B29-F687-4f45-9708-019B960494DF}">
-              <a14:hiddenLine xmlns:a14="http://schemas.microsoft.com/office/drawing/2010/main" xmlns="" w="9525">
+              <a14:hiddenLine xmlns="" xmlns:a14="http://schemas.microsoft.com/office/drawing/2010/main" w="9525">
                 <a:solidFill>
                   <a:srgbClr val="000000"/>
                 </a:solidFill>
@@ -11456,6 +11459,408 @@
 </p:sld>
 </file>
 
+<file path=ppt/slides/slide10.xml><?xml version="1.0" encoding="utf-8"?>
+<p:sld xmlns:a="http://schemas.openxmlformats.org/drawingml/2006/main" xmlns:r="http://schemas.openxmlformats.org/officeDocument/2006/relationships" xmlns:p="http://schemas.openxmlformats.org/presentationml/2006/main">
+  <p:cSld>
+    <p:spTree>
+      <p:nvGrpSpPr>
+        <p:cNvPr id="1" name=""/>
+        <p:cNvGrpSpPr/>
+        <p:nvPr/>
+      </p:nvGrpSpPr>
+      <p:grpSpPr>
+        <a:xfrm>
+          <a:off x="0" y="0"/>
+          <a:ext cx="0" cy="0"/>
+          <a:chOff x="0" y="0"/>
+          <a:chExt cx="0" cy="0"/>
+        </a:xfrm>
+      </p:grpSpPr>
+      <p:sp>
+        <p:nvSpPr>
+          <p:cNvPr id="6" name="Title 5">
+            <a:extLst>
+              <a:ext uri="{FF2B5EF4-FFF2-40B4-BE49-F238E27FC236}">
+                <a16:creationId xmlns:a16="http://schemas.microsoft.com/office/drawing/2014/main" id="{2E89989E-D04C-B847-9B11-F02A6FD2A1C4}"/>
+              </a:ext>
+            </a:extLst>
+          </p:cNvPr>
+          <p:cNvSpPr>
+            <a:spLocks noGrp="1"/>
+          </p:cNvSpPr>
+          <p:nvPr>
+            <p:ph type="title"/>
+          </p:nvPr>
+        </p:nvSpPr>
+        <p:spPr>
+          <a:xfrm>
+            <a:off x="2945296" y="345177"/>
+            <a:ext cx="6301409" cy="610234"/>
+          </a:xfrm>
+        </p:spPr>
+        <p:txBody>
+          <a:bodyPr/>
+          <a:lstStyle/>
+          <a:p>
+            <a:r>
+              <a:rPr lang="en-US" dirty="0"/>
+              <a:t>Your turn!</a:t>
+            </a:r>
+          </a:p>
+        </p:txBody>
+      </p:sp>
+      <p:sp>
+        <p:nvSpPr>
+          <p:cNvPr id="7" name="Subtitle 6">
+            <a:extLst>
+              <a:ext uri="{FF2B5EF4-FFF2-40B4-BE49-F238E27FC236}">
+                <a16:creationId xmlns:a16="http://schemas.microsoft.com/office/drawing/2014/main" id="{EBA0E148-4C2A-9348-A1BA-5D0C16BD646B}"/>
+              </a:ext>
+            </a:extLst>
+          </p:cNvPr>
+          <p:cNvSpPr>
+            <a:spLocks noGrp="1"/>
+          </p:cNvSpPr>
+          <p:nvPr>
+            <p:ph type="subTitle" idx="1"/>
+          </p:nvPr>
+        </p:nvSpPr>
+        <p:spPr>
+          <a:xfrm>
+            <a:off x="2945296" y="962686"/>
+            <a:ext cx="6301409" cy="191427"/>
+          </a:xfrm>
+        </p:spPr>
+        <p:txBody>
+          <a:bodyPr/>
+          <a:lstStyle/>
+          <a:p>
+            <a:r>
+              <a:rPr lang="en-US" dirty="0"/>
+              <a:t>Exercise 3</a:t>
+            </a:r>
+          </a:p>
+        </p:txBody>
+      </p:sp>
+      <p:sp>
+        <p:nvSpPr>
+          <p:cNvPr id="8" name="Text Placeholder 7">
+            <a:extLst>
+              <a:ext uri="{FF2B5EF4-FFF2-40B4-BE49-F238E27FC236}">
+                <a16:creationId xmlns:a16="http://schemas.microsoft.com/office/drawing/2014/main" id="{9A16DD07-06AF-8A4C-918A-515C4EF779FA}"/>
+              </a:ext>
+            </a:extLst>
+          </p:cNvPr>
+          <p:cNvSpPr>
+            <a:spLocks noGrp="1"/>
+          </p:cNvSpPr>
+          <p:nvPr>
+            <p:ph type="body" sz="quarter" idx="10"/>
+          </p:nvPr>
+        </p:nvSpPr>
+        <p:spPr>
+          <a:xfrm>
+            <a:off x="2090569" y="1343951"/>
+            <a:ext cx="8064650" cy="5168872"/>
+          </a:xfrm>
+        </p:spPr>
+        <p:txBody>
+          <a:bodyPr>
+            <a:normAutofit/>
+          </a:bodyPr>
+          <a:lstStyle/>
+          <a:p>
+            <a:pPr marL="457200" indent="-457200" algn="l">
+              <a:buFont typeface="Arial" panose="020B0604020202020204" pitchFamily="34" charset="0"/>
+              <a:buAutoNum type="arabicPeriod"/>
+            </a:pPr>
+            <a:r>
+              <a:rPr lang="en-US" dirty="0"/>
+              <a:t>Open </a:t>
+            </a:r>
+            <a:r>
+              <a:rPr lang="en-US" dirty="0">
+                <a:solidFill>
+                  <a:srgbClr val="0070C0"/>
+                </a:solidFill>
+                <a:latin typeface="Courier" pitchFamily="2" charset="0"/>
+              </a:rPr>
+              <a:t>templates/</a:t>
+            </a:r>
+            <a:r>
+              <a:rPr lang="en-US" dirty="0" err="1">
+                <a:solidFill>
+                  <a:srgbClr val="0070C0"/>
+                </a:solidFill>
+                <a:latin typeface="Courier" pitchFamily="2" charset="0"/>
+              </a:rPr>
+              <a:t>objectOrientedHandleClass.m</a:t>
+            </a:r>
+            <a:endParaRPr lang="en-US" dirty="0">
+              <a:solidFill>
+                <a:srgbClr val="0070C0"/>
+              </a:solidFill>
+              <a:latin typeface="Courier" pitchFamily="2" charset="0"/>
+            </a:endParaRPr>
+          </a:p>
+          <a:p>
+            <a:pPr marL="457200" indent="-457200" algn="l">
+              <a:buAutoNum type="arabicPeriod"/>
+            </a:pPr>
+            <a:r>
+              <a:rPr lang="en-US" dirty="0"/>
+              <a:t>Rename it to something else (a class of object)</a:t>
+            </a:r>
+          </a:p>
+          <a:p>
+            <a:pPr marL="914400" lvl="1" indent="-457200" algn="l">
+              <a:buFont typeface="Arial" panose="020B0604020202020204" pitchFamily="34" charset="0"/>
+              <a:buChar char="•"/>
+            </a:pPr>
+            <a:r>
+              <a:rPr lang="en-US" dirty="0"/>
+              <a:t>e.g. </a:t>
+            </a:r>
+            <a:r>
+              <a:rPr lang="en-US" dirty="0" err="1">
+                <a:solidFill>
+                  <a:srgbClr val="0070C0"/>
+                </a:solidFill>
+                <a:latin typeface="Courier" pitchFamily="2" charset="0"/>
+              </a:rPr>
+              <a:t>warehouse.m</a:t>
+            </a:r>
+            <a:endParaRPr lang="en-US" dirty="0"/>
+          </a:p>
+          <a:p>
+            <a:pPr marL="457200" indent="-457200" algn="l">
+              <a:buAutoNum type="arabicPeriod"/>
+            </a:pPr>
+            <a:r>
+              <a:rPr lang="en-US" dirty="0"/>
+              <a:t>Add a property that could contain your original object</a:t>
+            </a:r>
+          </a:p>
+          <a:p>
+            <a:pPr marL="914400" lvl="1" indent="-457200" algn="l">
+              <a:buFont typeface="Arial" panose="020B0604020202020204" pitchFamily="34" charset="0"/>
+              <a:buChar char="•"/>
+            </a:pPr>
+            <a:r>
+              <a:rPr lang="en-US" dirty="0"/>
+              <a:t>e.g. </a:t>
+            </a:r>
+            <a:r>
+              <a:rPr lang="en-US" dirty="0">
+                <a:solidFill>
+                  <a:srgbClr val="0070C0"/>
+                </a:solidFill>
+                <a:latin typeface="Courier" pitchFamily="2" charset="0"/>
+              </a:rPr>
+              <a:t>barrels</a:t>
+            </a:r>
+            <a:endParaRPr lang="en-US" dirty="0"/>
+          </a:p>
+          <a:p>
+            <a:pPr marL="457200" indent="-457200" algn="l">
+              <a:buAutoNum type="arabicPeriod"/>
+            </a:pPr>
+            <a:r>
+              <a:rPr lang="en-US" dirty="0"/>
+              <a:t>Update constructor function</a:t>
+            </a:r>
+          </a:p>
+          <a:p>
+            <a:pPr marL="914400" lvl="1" indent="-457200" algn="l">
+              <a:buFont typeface="Arial" panose="020B0604020202020204" pitchFamily="34" charset="0"/>
+              <a:buChar char="•"/>
+            </a:pPr>
+            <a:r>
+              <a:rPr lang="en-US" dirty="0"/>
+              <a:t>e.g. </a:t>
+            </a:r>
+            <a:r>
+              <a:rPr lang="en-US" dirty="0">
+                <a:solidFill>
+                  <a:srgbClr val="0070C0"/>
+                </a:solidFill>
+                <a:latin typeface="Courier" pitchFamily="2" charset="0"/>
+              </a:rPr>
+              <a:t>function </a:t>
+            </a:r>
+            <a:r>
+              <a:rPr lang="en-US" dirty="0" err="1">
+                <a:solidFill>
+                  <a:srgbClr val="0070C0"/>
+                </a:solidFill>
+                <a:latin typeface="Courier" pitchFamily="2" charset="0"/>
+              </a:rPr>
+              <a:t>obj</a:t>
+            </a:r>
+            <a:r>
+              <a:rPr lang="en-US" dirty="0">
+                <a:solidFill>
+                  <a:srgbClr val="0070C0"/>
+                </a:solidFill>
+                <a:latin typeface="Courier" pitchFamily="2" charset="0"/>
+              </a:rPr>
+              <a:t> = warehouse(location)</a:t>
+            </a:r>
+            <a:endParaRPr lang="en-US" dirty="0"/>
+          </a:p>
+          <a:p>
+            <a:pPr marL="457200" indent="-457200" algn="l">
+              <a:buAutoNum type="arabicPeriod"/>
+            </a:pPr>
+            <a:r>
+              <a:rPr lang="en-US" dirty="0"/>
+              <a:t>Implement way to create an “object of objects”</a:t>
+            </a:r>
+          </a:p>
+          <a:p>
+            <a:pPr marL="914400" lvl="1" indent="-457200" algn="l">
+              <a:buFont typeface="Arial" panose="020B0604020202020204" pitchFamily="34" charset="0"/>
+              <a:buChar char="•"/>
+            </a:pPr>
+            <a:r>
+              <a:rPr lang="en-US" dirty="0"/>
+              <a:t>e.g. </a:t>
+            </a:r>
+            <a:r>
+              <a:rPr lang="en-US" dirty="0">
+                <a:solidFill>
+                  <a:srgbClr val="0070C0"/>
+                </a:solidFill>
+                <a:latin typeface="Courier" pitchFamily="2" charset="0"/>
+              </a:rPr>
+              <a:t>function </a:t>
+            </a:r>
+            <a:r>
+              <a:rPr lang="en-US" dirty="0" err="1">
+                <a:solidFill>
+                  <a:srgbClr val="0070C0"/>
+                </a:solidFill>
+                <a:latin typeface="Courier" pitchFamily="2" charset="0"/>
+              </a:rPr>
+              <a:t>addBarrel</a:t>
+            </a:r>
+            <a:r>
+              <a:rPr lang="en-US" dirty="0">
+                <a:solidFill>
+                  <a:srgbClr val="0070C0"/>
+                </a:solidFill>
+                <a:latin typeface="Courier" pitchFamily="2" charset="0"/>
+              </a:rPr>
+              <a:t>(</a:t>
+            </a:r>
+            <a:r>
+              <a:rPr lang="en-US" dirty="0" err="1">
+                <a:solidFill>
+                  <a:srgbClr val="0070C0"/>
+                </a:solidFill>
+                <a:latin typeface="Courier" pitchFamily="2" charset="0"/>
+              </a:rPr>
+              <a:t>obj,nMonkeys</a:t>
+            </a:r>
+            <a:r>
+              <a:rPr lang="en-US" dirty="0">
+                <a:solidFill>
+                  <a:srgbClr val="0070C0"/>
+                </a:solidFill>
+                <a:latin typeface="Courier" pitchFamily="2" charset="0"/>
+              </a:rPr>
+              <a:t>)</a:t>
+            </a:r>
+            <a:endParaRPr lang="en-US" dirty="0"/>
+          </a:p>
+          <a:p>
+            <a:pPr marL="457200" indent="-457200" algn="l">
+              <a:buFont typeface="Arial" panose="020B0604020202020204" pitchFamily="34" charset="0"/>
+              <a:buAutoNum type="arabicPeriod"/>
+            </a:pPr>
+            <a:r>
+              <a:rPr lang="en-US" dirty="0"/>
+              <a:t>Write a driver file to fill your new object with your original objects</a:t>
+            </a:r>
+          </a:p>
+          <a:p>
+            <a:pPr marL="914400" lvl="1" indent="-457200" algn="l">
+              <a:buFont typeface="Arial" panose="020B0604020202020204" pitchFamily="34" charset="0"/>
+              <a:buChar char="•"/>
+            </a:pPr>
+            <a:r>
+              <a:rPr lang="en-US" dirty="0"/>
+              <a:t>e.g. </a:t>
+            </a:r>
+            <a:r>
+              <a:rPr lang="en-US" dirty="0" err="1">
+                <a:solidFill>
+                  <a:srgbClr val="0070C0"/>
+                </a:solidFill>
+                <a:latin typeface="Courier" pitchFamily="2" charset="0"/>
+              </a:rPr>
+              <a:t>monkeyWarehouseExample.m</a:t>
+            </a:r>
+            <a:r>
+              <a:rPr lang="en-US" dirty="0"/>
+              <a:t> creates a warehouse with 5 empty barrels, so I then fill up half of them</a:t>
+            </a:r>
+            <a:endParaRPr lang="en-US" dirty="0">
+              <a:solidFill>
+                <a:srgbClr val="0070C0"/>
+              </a:solidFill>
+              <a:latin typeface="Courier" pitchFamily="2" charset="0"/>
+            </a:endParaRPr>
+          </a:p>
+        </p:txBody>
+      </p:sp>
+      <p:sp>
+        <p:nvSpPr>
+          <p:cNvPr id="5" name="Slide Number Placeholder 4">
+            <a:extLst>
+              <a:ext uri="{FF2B5EF4-FFF2-40B4-BE49-F238E27FC236}">
+                <a16:creationId xmlns:a16="http://schemas.microsoft.com/office/drawing/2014/main" id="{10231D7A-DD6D-0B43-94F8-716B648B9F87}"/>
+              </a:ext>
+            </a:extLst>
+          </p:cNvPr>
+          <p:cNvSpPr>
+            <a:spLocks noGrp="1"/>
+          </p:cNvSpPr>
+          <p:nvPr>
+            <p:ph type="sldNum" sz="quarter" idx="11"/>
+          </p:nvPr>
+        </p:nvSpPr>
+        <p:spPr>
+          <a:xfrm>
+            <a:off x="11786838" y="5771480"/>
+            <a:ext cx="405161" cy="365125"/>
+          </a:xfrm>
+        </p:spPr>
+        <p:txBody>
+          <a:bodyPr/>
+          <a:lstStyle/>
+          <a:p>
+            <a:fld id="{E62A57C8-5936-4048-93E2-2CC94939D132}" type="slidenum">
+              <a:rPr lang="en-US" smtClean="0"/>
+              <a:t>10</a:t>
+            </a:fld>
+            <a:endParaRPr lang="en-US"/>
+          </a:p>
+        </p:txBody>
+      </p:sp>
+    </p:spTree>
+    <p:extLst>
+      <p:ext uri="{BB962C8B-B14F-4D97-AF65-F5344CB8AC3E}">
+        <p14:creationId xmlns:p14="http://schemas.microsoft.com/office/powerpoint/2010/main" val="1348162986"/>
+      </p:ext>
+    </p:extLst>
+  </p:cSld>
+  <p:clrMapOvr>
+    <a:masterClrMapping/>
+  </p:clrMapOvr>
+</p:sld>
+</file>
+
 <file path=ppt/slides/slide2.xml><?xml version="1.0" encoding="utf-8"?>
 <p:sld xmlns:a="http://schemas.openxmlformats.org/drawingml/2006/main" xmlns:r="http://schemas.openxmlformats.org/officeDocument/2006/relationships" xmlns:p="http://schemas.openxmlformats.org/presentationml/2006/main">
   <p:cSld>
@@ -11767,8 +12172,8 @@
           <p:nvPr/>
         </p:nvSpPr>
         <p:spPr>
-          <a:xfrm>
-            <a:off x="0" y="6642556"/>
+          <a:xfrm rot="16200000">
+            <a:off x="10102806" y="4768806"/>
             <a:ext cx="3962944" cy="215444"/>
           </a:xfrm>
           <a:prstGeom prst="rect">
@@ -12502,7 +12907,7 @@
         <p:spPr>
           <a:xfrm>
             <a:off x="5600529" y="5734783"/>
-            <a:ext cx="6186309" cy="646331"/>
+            <a:ext cx="6186309" cy="923330"/>
           </a:xfrm>
           <a:prstGeom prst="rect">
             <a:avLst/>
@@ -12510,7 +12915,7 @@
           <a:noFill/>
         </p:spPr>
         <p:txBody>
-          <a:bodyPr wrap="none" rtlCol="0">
+          <a:bodyPr wrap="square" rtlCol="0">
             <a:spAutoFit/>
           </a:bodyPr>
           <a:lstStyle/>
@@ -12523,7 +12928,7 @@
           <a:p>
             <a:r>
               <a:rPr lang="en-US" dirty="0"/>
-              <a:t>The constants are useful for consistent style of many plots.</a:t>
+              <a:t>The constants are useful for consistent style of many plots, as well as setting locations of certain folders.</a:t>
             </a:r>
           </a:p>
         </p:txBody>
@@ -12560,10 +12965,10 @@
       </p:grpSpPr>
       <p:sp>
         <p:nvSpPr>
-          <p:cNvPr id="2" name="Title 1">
-            <a:extLst>
-              <a:ext uri="{FF2B5EF4-FFF2-40B4-BE49-F238E27FC236}">
-                <a16:creationId xmlns:a16="http://schemas.microsoft.com/office/drawing/2014/main" id="{F290A067-F07B-0046-8728-F04690F28C53}"/>
+          <p:cNvPr id="6" name="Title 5">
+            <a:extLst>
+              <a:ext uri="{FF2B5EF4-FFF2-40B4-BE49-F238E27FC236}">
+                <a16:creationId xmlns:a16="http://schemas.microsoft.com/office/drawing/2014/main" id="{2E89989E-D04C-B847-9B11-F02A6FD2A1C4}"/>
               </a:ext>
             </a:extLst>
           </p:cNvPr>
@@ -12576,8 +12981,8 @@
         </p:nvSpPr>
         <p:spPr>
           <a:xfrm>
-            <a:off x="193638" y="476886"/>
-            <a:ext cx="11804724" cy="610234"/>
+            <a:off x="2945296" y="1259577"/>
+            <a:ext cx="6301409" cy="610234"/>
           </a:xfrm>
         </p:spPr>
         <p:txBody>
@@ -12586,31 +12991,64 @@
           <a:p>
             <a:r>
               <a:rPr lang="en-US" dirty="0"/>
-              <a:t>Example 4: MatLab object oriented programming</a:t>
-            </a:r>
-          </a:p>
-        </p:txBody>
-      </p:sp>
-      <p:sp>
-        <p:nvSpPr>
-          <p:cNvPr id="3" name="Content Placeholder 2">
-            <a:extLst>
-              <a:ext uri="{FF2B5EF4-FFF2-40B4-BE49-F238E27FC236}">
-                <a16:creationId xmlns:a16="http://schemas.microsoft.com/office/drawing/2014/main" id="{2E58624B-8B68-A14B-BA0A-0183266D0F3F}"/>
-              </a:ext>
-            </a:extLst>
-          </p:cNvPr>
-          <p:cNvSpPr>
-            <a:spLocks noGrp="1"/>
-          </p:cNvSpPr>
-          <p:nvPr>
-            <p:ph idx="1"/>
-          </p:nvPr>
-        </p:nvSpPr>
-        <p:spPr>
-          <a:xfrm>
-            <a:off x="838200" y="1825625"/>
-            <a:ext cx="10515600" cy="4338508"/>
+              <a:t>Your turn!</a:t>
+            </a:r>
+          </a:p>
+        </p:txBody>
+      </p:sp>
+      <p:sp>
+        <p:nvSpPr>
+          <p:cNvPr id="7" name="Subtitle 6">
+            <a:extLst>
+              <a:ext uri="{FF2B5EF4-FFF2-40B4-BE49-F238E27FC236}">
+                <a16:creationId xmlns:a16="http://schemas.microsoft.com/office/drawing/2014/main" id="{EBA0E148-4C2A-9348-A1BA-5D0C16BD646B}"/>
+              </a:ext>
+            </a:extLst>
+          </p:cNvPr>
+          <p:cNvSpPr>
+            <a:spLocks noGrp="1"/>
+          </p:cNvSpPr>
+          <p:nvPr>
+            <p:ph type="subTitle" idx="1"/>
+          </p:nvPr>
+        </p:nvSpPr>
+        <p:spPr>
+          <a:xfrm>
+            <a:off x="2945296" y="1877086"/>
+            <a:ext cx="6301409" cy="191427"/>
+          </a:xfrm>
+        </p:spPr>
+        <p:txBody>
+          <a:bodyPr/>
+          <a:lstStyle/>
+          <a:p>
+            <a:r>
+              <a:rPr lang="en-US" dirty="0"/>
+              <a:t>Exercise 1</a:t>
+            </a:r>
+          </a:p>
+        </p:txBody>
+      </p:sp>
+      <p:sp>
+        <p:nvSpPr>
+          <p:cNvPr id="8" name="Text Placeholder 7">
+            <a:extLst>
+              <a:ext uri="{FF2B5EF4-FFF2-40B4-BE49-F238E27FC236}">
+                <a16:creationId xmlns:a16="http://schemas.microsoft.com/office/drawing/2014/main" id="{9A16DD07-06AF-8A4C-918A-515C4EF779FA}"/>
+              </a:ext>
+            </a:extLst>
+          </p:cNvPr>
+          <p:cNvSpPr>
+            <a:spLocks noGrp="1"/>
+          </p:cNvSpPr>
+          <p:nvPr>
+            <p:ph type="body" sz="quarter" idx="10"/>
+          </p:nvPr>
+        </p:nvSpPr>
+        <p:spPr>
+          <a:xfrm>
+            <a:off x="2361304" y="2258351"/>
+            <a:ext cx="7469392" cy="3695691"/>
           </a:xfrm>
         </p:spPr>
         <p:txBody>
@@ -12619,161 +13057,202 @@
           </a:bodyPr>
           <a:lstStyle/>
           <a:p>
-            <a:r>
-              <a:rPr lang="en-US" b="1" dirty="0"/>
-              <a:t>What is awesome:</a:t>
-            </a:r>
-            <a:endParaRPr lang="en-US" dirty="0"/>
-          </a:p>
-          <a:p>
-            <a:pPr marL="342900" indent="-342900">
+            <a:pPr marL="457200" indent="-457200" algn="l">
+              <a:buFont typeface="Arial" panose="020B0604020202020204" pitchFamily="34" charset="0"/>
+              <a:buAutoNum type="arabicPeriod"/>
+            </a:pPr>
+            <a:r>
+              <a:rPr lang="en-US" dirty="0"/>
+              <a:t>Open </a:t>
+            </a:r>
+            <a:r>
+              <a:rPr lang="en-US" dirty="0">
+                <a:solidFill>
+                  <a:srgbClr val="0070C0"/>
+                </a:solidFill>
+                <a:latin typeface="Courier" pitchFamily="2" charset="0"/>
+              </a:rPr>
+              <a:t>templates/</a:t>
+            </a:r>
+            <a:r>
+              <a:rPr lang="en-US" dirty="0" err="1">
+                <a:solidFill>
+                  <a:srgbClr val="0070C0"/>
+                </a:solidFill>
+                <a:latin typeface="Courier" pitchFamily="2" charset="0"/>
+              </a:rPr>
+              <a:t>staticClass.m</a:t>
+            </a:r>
+            <a:endParaRPr lang="en-US" dirty="0">
+              <a:solidFill>
+                <a:srgbClr val="0070C0"/>
+              </a:solidFill>
+              <a:latin typeface="Courier" pitchFamily="2" charset="0"/>
+            </a:endParaRPr>
+          </a:p>
+          <a:p>
+            <a:pPr marL="457200" indent="-457200" algn="l">
+              <a:buAutoNum type="arabicPeriod"/>
+            </a:pPr>
+            <a:r>
+              <a:rPr lang="en-US" dirty="0"/>
+              <a:t>Rename it to something else </a:t>
+            </a:r>
+          </a:p>
+          <a:p>
+            <a:pPr marL="914400" lvl="1" indent="-457200" algn="l">
               <a:buFont typeface="Arial" panose="020B0604020202020204" pitchFamily="34" charset="0"/>
               <a:buChar char="•"/>
             </a:pPr>
             <a:r>
               <a:rPr lang="en-US" dirty="0"/>
-              <a:t>Creates </a:t>
-            </a:r>
-            <a:r>
-              <a:rPr lang="en-US" b="1" dirty="0"/>
-              <a:t>instances</a:t>
-            </a:r>
-            <a:r>
-              <a:rPr lang="en-US" b="1" i="1" dirty="0"/>
-              <a:t> </a:t>
-            </a:r>
+              <a:t>e.g. </a:t>
+            </a:r>
+            <a:r>
+              <a:rPr lang="en-US" dirty="0" err="1">
+                <a:solidFill>
+                  <a:srgbClr val="0070C0"/>
+                </a:solidFill>
+                <a:latin typeface="Courier" pitchFamily="2" charset="0"/>
+              </a:rPr>
+              <a:t>ageFunctions.m</a:t>
+            </a:r>
+            <a:endParaRPr lang="en-US" dirty="0"/>
+          </a:p>
+          <a:p>
+            <a:pPr marL="457200" indent="-457200" algn="l">
+              <a:buAutoNum type="arabicPeriod"/>
+            </a:pPr>
             <a:r>
               <a:rPr lang="en-US" dirty="0"/>
-              <a:t>of </a:t>
-            </a:r>
-            <a:r>
-              <a:rPr lang="en-US" i="1" dirty="0"/>
-              <a:t>objects</a:t>
-            </a:r>
-            <a:r>
-              <a:rPr lang="en-US" dirty="0"/>
-              <a:t>, with specific </a:t>
-            </a:r>
-            <a:r>
-              <a:rPr lang="en-US" b="1" dirty="0"/>
-              <a:t>properties </a:t>
-            </a:r>
-            <a:r>
-              <a:rPr lang="en-US" dirty="0"/>
-              <a:t>and </a:t>
-            </a:r>
-            <a:r>
-              <a:rPr lang="en-US" b="1" dirty="0"/>
-              <a:t>functions</a:t>
-            </a:r>
-            <a:r>
-              <a:rPr lang="en-US" dirty="0"/>
-              <a:t>.</a:t>
-            </a:r>
-          </a:p>
-          <a:p>
-            <a:pPr marL="342900" indent="-342900">
+              <a:t>Add two new properties to the class </a:t>
+            </a:r>
+          </a:p>
+          <a:p>
+            <a:pPr marL="914400" lvl="1" indent="-457200" algn="l">
               <a:buFont typeface="Arial" panose="020B0604020202020204" pitchFamily="34" charset="0"/>
               <a:buChar char="•"/>
             </a:pPr>
             <a:r>
               <a:rPr lang="en-US" dirty="0"/>
-              <a:t>Can have constraints on setting properties</a:t>
-            </a:r>
-          </a:p>
-          <a:p>
-            <a:pPr marL="342900" indent="-342900">
+              <a:t>e.g. </a:t>
+            </a:r>
+            <a:r>
+              <a:rPr lang="en-US" dirty="0" err="1">
+                <a:solidFill>
+                  <a:srgbClr val="0070C0"/>
+                </a:solidFill>
+                <a:latin typeface="Courier" pitchFamily="2" charset="0"/>
+              </a:rPr>
+              <a:t>worldRecordAge</a:t>
+            </a:r>
+            <a:endParaRPr lang="en-US" dirty="0"/>
+          </a:p>
+          <a:p>
+            <a:pPr marL="457200" indent="-457200" algn="l">
+              <a:buAutoNum type="arabicPeriod"/>
+            </a:pPr>
+            <a:r>
+              <a:rPr lang="en-US" dirty="0"/>
+              <a:t>Write two new functions in the class, get creative! </a:t>
+            </a:r>
+          </a:p>
+          <a:p>
+            <a:pPr marL="914400" lvl="1" indent="-457200" algn="l">
               <a:buFont typeface="Arial" panose="020B0604020202020204" pitchFamily="34" charset="0"/>
               <a:buChar char="•"/>
             </a:pPr>
             <a:r>
               <a:rPr lang="en-US" dirty="0"/>
-              <a:t>Properties can be dependent on other properties</a:t>
-            </a:r>
-          </a:p>
-          <a:p>
-            <a:pPr marL="342900" indent="-342900">
+              <a:t>e.g. </a:t>
+            </a:r>
+            <a:r>
+              <a:rPr lang="en-US" dirty="0">
+                <a:solidFill>
+                  <a:srgbClr val="0070C0"/>
+                </a:solidFill>
+                <a:latin typeface="Courier" pitchFamily="2" charset="0"/>
+              </a:rPr>
+              <a:t>years = </a:t>
+            </a:r>
+            <a:r>
+              <a:rPr lang="en-US" dirty="0" err="1">
+                <a:solidFill>
+                  <a:srgbClr val="0070C0"/>
+                </a:solidFill>
+                <a:latin typeface="Courier" pitchFamily="2" charset="0"/>
+              </a:rPr>
+              <a:t>howManyYearsToBreakRecord</a:t>
+            </a:r>
+            <a:r>
+              <a:rPr lang="en-US" dirty="0">
+                <a:solidFill>
+                  <a:srgbClr val="0070C0"/>
+                </a:solidFill>
+                <a:latin typeface="Courier" pitchFamily="2" charset="0"/>
+              </a:rPr>
+              <a:t>(DOB)</a:t>
+            </a:r>
+            <a:endParaRPr lang="en-US" dirty="0"/>
+          </a:p>
+          <a:p>
+            <a:pPr marL="457200" indent="-457200" algn="l">
+              <a:buAutoNum type="arabicPeriod"/>
+            </a:pPr>
+            <a:r>
+              <a:rPr lang="en-US" dirty="0"/>
+              <a:t>Write a driver file to practice using functions from the class </a:t>
+            </a:r>
+          </a:p>
+          <a:p>
+            <a:pPr marL="914400" lvl="1" indent="-457200" algn="l">
               <a:buFont typeface="Arial" panose="020B0604020202020204" pitchFamily="34" charset="0"/>
               <a:buChar char="•"/>
             </a:pPr>
             <a:r>
               <a:rPr lang="en-US" dirty="0"/>
-              <a:t>“objects of objects”</a:t>
-            </a:r>
-          </a:p>
-          <a:p>
-            <a:pPr marL="342900" indent="-342900">
-              <a:buFont typeface="Arial" panose="020B0604020202020204" pitchFamily="34" charset="0"/>
-              <a:buChar char="•"/>
-            </a:pPr>
-            <a:endParaRPr lang="en-US" dirty="0"/>
-          </a:p>
-          <a:p>
-            <a:r>
-              <a:rPr lang="en-US" b="1" dirty="0"/>
-              <a:t>What is not awesome:</a:t>
-            </a:r>
-          </a:p>
-          <a:p>
-            <a:pPr marL="342900" indent="-342900">
-              <a:buFont typeface="Arial" panose="020B0604020202020204" pitchFamily="34" charset="0"/>
-              <a:buChar char="•"/>
-            </a:pPr>
-            <a:r>
-              <a:rPr lang="en-US" dirty="0"/>
-              <a:t>Objects need to be re-saved whenever properties change, overwriting past object</a:t>
-            </a:r>
-          </a:p>
-          <a:p>
-            <a:pPr marL="342900" indent="-342900">
-              <a:buFont typeface="Arial" panose="020B0604020202020204" pitchFamily="34" charset="0"/>
-              <a:buChar char="•"/>
-            </a:pPr>
-            <a:r>
-              <a:rPr lang="en-US" dirty="0"/>
-              <a:t>Can be tricky to keep track of when objects change</a:t>
-            </a:r>
-          </a:p>
-          <a:p>
-            <a:pPr marL="342900" indent="-342900">
-              <a:buFont typeface="Arial" panose="020B0604020202020204" pitchFamily="34" charset="0"/>
-              <a:buChar char="•"/>
-            </a:pPr>
-            <a:endParaRPr lang="en-US" dirty="0"/>
-          </a:p>
-          <a:p>
-            <a:pPr marL="342900" indent="-342900">
-              <a:buFont typeface="Arial" panose="020B0604020202020204" pitchFamily="34" charset="0"/>
-              <a:buChar char="•"/>
-            </a:pPr>
-            <a:endParaRPr lang="en-US" i="1" dirty="0"/>
-          </a:p>
-          <a:p>
-            <a:pPr marL="342900" indent="-342900">
-              <a:buFont typeface="Arial" panose="020B0604020202020204" pitchFamily="34" charset="0"/>
-              <a:buChar char="•"/>
-            </a:pPr>
-            <a:endParaRPr lang="en-US" dirty="0"/>
-          </a:p>
-        </p:txBody>
-      </p:sp>
-      <p:sp>
-        <p:nvSpPr>
-          <p:cNvPr id="4" name="Slide Number Placeholder 3">
-            <a:extLst>
-              <a:ext uri="{FF2B5EF4-FFF2-40B4-BE49-F238E27FC236}">
-                <a16:creationId xmlns:a16="http://schemas.microsoft.com/office/drawing/2014/main" id="{4A11F5FE-2285-774F-980F-237EE5879233}"/>
-              </a:ext>
-            </a:extLst>
-          </p:cNvPr>
-          <p:cNvSpPr>
-            <a:spLocks noGrp="1"/>
-          </p:cNvSpPr>
-          <p:nvPr>
-            <p:ph type="sldNum" sz="quarter" idx="10"/>
-          </p:nvPr>
-        </p:nvSpPr>
-        <p:spPr/>
+              <a:t>e.g. </a:t>
+            </a:r>
+            <a:r>
+              <a:rPr lang="en-US" dirty="0" err="1">
+                <a:solidFill>
+                  <a:srgbClr val="0070C0"/>
+                </a:solidFill>
+                <a:latin typeface="Courier" pitchFamily="2" charset="0"/>
+              </a:rPr>
+              <a:t>ageFunctionsExample.m</a:t>
+            </a:r>
+            <a:endParaRPr lang="en-US" dirty="0">
+              <a:solidFill>
+                <a:srgbClr val="0070C0"/>
+              </a:solidFill>
+              <a:latin typeface="Courier" pitchFamily="2" charset="0"/>
+            </a:endParaRPr>
+          </a:p>
+        </p:txBody>
+      </p:sp>
+      <p:sp>
+        <p:nvSpPr>
+          <p:cNvPr id="5" name="Slide Number Placeholder 4">
+            <a:extLst>
+              <a:ext uri="{FF2B5EF4-FFF2-40B4-BE49-F238E27FC236}">
+                <a16:creationId xmlns:a16="http://schemas.microsoft.com/office/drawing/2014/main" id="{10231D7A-DD6D-0B43-94F8-716B648B9F87}"/>
+              </a:ext>
+            </a:extLst>
+          </p:cNvPr>
+          <p:cNvSpPr>
+            <a:spLocks noGrp="1"/>
+          </p:cNvSpPr>
+          <p:nvPr>
+            <p:ph type="sldNum" sz="quarter" idx="11"/>
+          </p:nvPr>
+        </p:nvSpPr>
+        <p:spPr>
+          <a:xfrm>
+            <a:off x="11786838" y="5771480"/>
+            <a:ext cx="405161" cy="365125"/>
+          </a:xfrm>
+        </p:spPr>
         <p:txBody>
           <a:bodyPr/>
           <a:lstStyle/>
@@ -12789,7 +13268,7 @@
     </p:spTree>
     <p:extLst>
       <p:ext uri="{BB962C8B-B14F-4D97-AF65-F5344CB8AC3E}">
-        <p14:creationId xmlns:p14="http://schemas.microsoft.com/office/powerpoint/2010/main" val="601621790"/>
+        <p14:creationId xmlns:p14="http://schemas.microsoft.com/office/powerpoint/2010/main" val="3554227658"/>
       </p:ext>
     </p:extLst>
   </p:cSld>
@@ -12839,47 +13318,45 @@
           </a:xfrm>
         </p:spPr>
         <p:txBody>
+          <a:bodyPr/>
+          <a:lstStyle/>
+          <a:p>
+            <a:r>
+              <a:rPr lang="en-US" dirty="0"/>
+              <a:t>Example 4: MatLab object oriented programming</a:t>
+            </a:r>
+          </a:p>
+        </p:txBody>
+      </p:sp>
+      <p:sp>
+        <p:nvSpPr>
+          <p:cNvPr id="3" name="Content Placeholder 2">
+            <a:extLst>
+              <a:ext uri="{FF2B5EF4-FFF2-40B4-BE49-F238E27FC236}">
+                <a16:creationId xmlns:a16="http://schemas.microsoft.com/office/drawing/2014/main" id="{2E58624B-8B68-A14B-BA0A-0183266D0F3F}"/>
+              </a:ext>
+            </a:extLst>
+          </p:cNvPr>
+          <p:cNvSpPr>
+            <a:spLocks noGrp="1"/>
+          </p:cNvSpPr>
+          <p:nvPr>
+            <p:ph idx="1"/>
+          </p:nvPr>
+        </p:nvSpPr>
+        <p:spPr>
+          <a:xfrm>
+            <a:off x="838200" y="1825625"/>
+            <a:ext cx="10515600" cy="4338508"/>
+          </a:xfrm>
+        </p:spPr>
+        <p:txBody>
           <a:bodyPr>
             <a:normAutofit/>
           </a:bodyPr>
           <a:lstStyle/>
           <a:p>
             <a:r>
-              <a:rPr lang="en-US" dirty="0"/>
-              <a:t>Example 5: MatLab object oriented programming with handle</a:t>
-            </a:r>
-          </a:p>
-        </p:txBody>
-      </p:sp>
-      <p:sp>
-        <p:nvSpPr>
-          <p:cNvPr id="3" name="Content Placeholder 2">
-            <a:extLst>
-              <a:ext uri="{FF2B5EF4-FFF2-40B4-BE49-F238E27FC236}">
-                <a16:creationId xmlns:a16="http://schemas.microsoft.com/office/drawing/2014/main" id="{2E58624B-8B68-A14B-BA0A-0183266D0F3F}"/>
-              </a:ext>
-            </a:extLst>
-          </p:cNvPr>
-          <p:cNvSpPr>
-            <a:spLocks noGrp="1"/>
-          </p:cNvSpPr>
-          <p:nvPr>
-            <p:ph idx="1"/>
-          </p:nvPr>
-        </p:nvSpPr>
-        <p:spPr>
-          <a:xfrm>
-            <a:off x="838200" y="1825624"/>
-            <a:ext cx="10515600" cy="5032375"/>
-          </a:xfrm>
-        </p:spPr>
-        <p:txBody>
-          <a:bodyPr>
-            <a:normAutofit/>
-          </a:bodyPr>
-          <a:lstStyle/>
-          <a:p>
-            <a:r>
               <a:rPr lang="en-US" b="1" dirty="0"/>
               <a:t>What is awesome:</a:t>
             </a:r>
@@ -12959,26 +13436,6 @@
             <a:r>
               <a:rPr lang="en-US" dirty="0"/>
               <a:t>“objects of objects”</a:t>
-            </a:r>
-          </a:p>
-          <a:p>
-            <a:pPr marL="342900" indent="-342900">
-              <a:buFont typeface="Arial" panose="020B0604020202020204" pitchFamily="34" charset="0"/>
-              <a:buChar char="•"/>
-            </a:pPr>
-            <a:r>
-              <a:rPr lang="en-US" dirty="0"/>
-              <a:t>Object properties are saved automatically whenever they change</a:t>
-            </a:r>
-          </a:p>
-          <a:p>
-            <a:pPr marL="342900" indent="-342900">
-              <a:buFont typeface="Arial" panose="020B0604020202020204" pitchFamily="34" charset="0"/>
-              <a:buChar char="•"/>
-            </a:pPr>
-            <a:r>
-              <a:rPr lang="en-US" dirty="0"/>
-              <a:t>Keeping track of objects is intuitive</a:t>
             </a:r>
           </a:p>
           <a:p>
@@ -13001,8 +13458,25 @@
             </a:pPr>
             <a:r>
               <a:rPr lang="en-US" dirty="0"/>
-              <a:t>Might not be ideal for all workflows. Often, static classes are the best place to start.</a:t>
-            </a:r>
+              <a:t>Objects need to be re-saved whenever properties change, overwriting past object</a:t>
+            </a:r>
+          </a:p>
+          <a:p>
+            <a:pPr marL="342900" indent="-342900">
+              <a:buFont typeface="Arial" panose="020B0604020202020204" pitchFamily="34" charset="0"/>
+              <a:buChar char="•"/>
+            </a:pPr>
+            <a:r>
+              <a:rPr lang="en-US" dirty="0"/>
+              <a:t>Can be tricky to keep track of when objects change</a:t>
+            </a:r>
+          </a:p>
+          <a:p>
+            <a:pPr marL="342900" indent="-342900">
+              <a:buFont typeface="Arial" panose="020B0604020202020204" pitchFamily="34" charset="0"/>
+              <a:buChar char="•"/>
+            </a:pPr>
+            <a:endParaRPr lang="en-US" dirty="0"/>
           </a:p>
           <a:p>
             <a:pPr marL="342900" indent="-342900">
@@ -13044,6 +13518,730 @@
             <a:fld id="{E62A57C8-5936-4048-93E2-2CC94939D132}" type="slidenum">
               <a:rPr lang="en-US" smtClean="0"/>
               <a:t>7</a:t>
+            </a:fld>
+            <a:endParaRPr lang="en-US"/>
+          </a:p>
+        </p:txBody>
+      </p:sp>
+    </p:spTree>
+    <p:extLst>
+      <p:ext uri="{BB962C8B-B14F-4D97-AF65-F5344CB8AC3E}">
+        <p14:creationId xmlns:p14="http://schemas.microsoft.com/office/powerpoint/2010/main" val="601621790"/>
+      </p:ext>
+    </p:extLst>
+  </p:cSld>
+  <p:clrMapOvr>
+    <a:masterClrMapping/>
+  </p:clrMapOvr>
+</p:sld>
+</file>
+
+<file path=ppt/slides/slide8.xml><?xml version="1.0" encoding="utf-8"?>
+<p:sld xmlns:a="http://schemas.openxmlformats.org/drawingml/2006/main" xmlns:r="http://schemas.openxmlformats.org/officeDocument/2006/relationships" xmlns:p="http://schemas.openxmlformats.org/presentationml/2006/main">
+  <p:cSld>
+    <p:spTree>
+      <p:nvGrpSpPr>
+        <p:cNvPr id="1" name=""/>
+        <p:cNvGrpSpPr/>
+        <p:nvPr/>
+      </p:nvGrpSpPr>
+      <p:grpSpPr>
+        <a:xfrm>
+          <a:off x="0" y="0"/>
+          <a:ext cx="0" cy="0"/>
+          <a:chOff x="0" y="0"/>
+          <a:chExt cx="0" cy="0"/>
+        </a:xfrm>
+      </p:grpSpPr>
+      <p:sp>
+        <p:nvSpPr>
+          <p:cNvPr id="6" name="Title 5">
+            <a:extLst>
+              <a:ext uri="{FF2B5EF4-FFF2-40B4-BE49-F238E27FC236}">
+                <a16:creationId xmlns:a16="http://schemas.microsoft.com/office/drawing/2014/main" id="{2E89989E-D04C-B847-9B11-F02A6FD2A1C4}"/>
+              </a:ext>
+            </a:extLst>
+          </p:cNvPr>
+          <p:cNvSpPr>
+            <a:spLocks noGrp="1"/>
+          </p:cNvSpPr>
+          <p:nvPr>
+            <p:ph type="title"/>
+          </p:nvPr>
+        </p:nvSpPr>
+        <p:spPr>
+          <a:xfrm>
+            <a:off x="2945296" y="345177"/>
+            <a:ext cx="6301409" cy="610234"/>
+          </a:xfrm>
+        </p:spPr>
+        <p:txBody>
+          <a:bodyPr/>
+          <a:lstStyle/>
+          <a:p>
+            <a:r>
+              <a:rPr lang="en-US" dirty="0"/>
+              <a:t>Your turn!</a:t>
+            </a:r>
+          </a:p>
+        </p:txBody>
+      </p:sp>
+      <p:sp>
+        <p:nvSpPr>
+          <p:cNvPr id="7" name="Subtitle 6">
+            <a:extLst>
+              <a:ext uri="{FF2B5EF4-FFF2-40B4-BE49-F238E27FC236}">
+                <a16:creationId xmlns:a16="http://schemas.microsoft.com/office/drawing/2014/main" id="{EBA0E148-4C2A-9348-A1BA-5D0C16BD646B}"/>
+              </a:ext>
+            </a:extLst>
+          </p:cNvPr>
+          <p:cNvSpPr>
+            <a:spLocks noGrp="1"/>
+          </p:cNvSpPr>
+          <p:nvPr>
+            <p:ph type="subTitle" idx="1"/>
+          </p:nvPr>
+        </p:nvSpPr>
+        <p:spPr>
+          <a:xfrm>
+            <a:off x="2945296" y="962686"/>
+            <a:ext cx="6301409" cy="191427"/>
+          </a:xfrm>
+        </p:spPr>
+        <p:txBody>
+          <a:bodyPr/>
+          <a:lstStyle/>
+          <a:p>
+            <a:r>
+              <a:rPr lang="en-US" dirty="0"/>
+              <a:t>Exercise 2</a:t>
+            </a:r>
+          </a:p>
+        </p:txBody>
+      </p:sp>
+      <p:sp>
+        <p:nvSpPr>
+          <p:cNvPr id="8" name="Text Placeholder 7">
+            <a:extLst>
+              <a:ext uri="{FF2B5EF4-FFF2-40B4-BE49-F238E27FC236}">
+                <a16:creationId xmlns:a16="http://schemas.microsoft.com/office/drawing/2014/main" id="{9A16DD07-06AF-8A4C-918A-515C4EF779FA}"/>
+              </a:ext>
+            </a:extLst>
+          </p:cNvPr>
+          <p:cNvSpPr>
+            <a:spLocks noGrp="1"/>
+          </p:cNvSpPr>
+          <p:nvPr>
+            <p:ph type="body" sz="quarter" idx="10"/>
+          </p:nvPr>
+        </p:nvSpPr>
+        <p:spPr>
+          <a:xfrm>
+            <a:off x="2090569" y="1343951"/>
+            <a:ext cx="8064650" cy="5168872"/>
+          </a:xfrm>
+        </p:spPr>
+        <p:txBody>
+          <a:bodyPr>
+            <a:normAutofit/>
+          </a:bodyPr>
+          <a:lstStyle/>
+          <a:p>
+            <a:pPr marL="457200" indent="-457200" algn="l">
+              <a:buFont typeface="Arial" panose="020B0604020202020204" pitchFamily="34" charset="0"/>
+              <a:buAutoNum type="arabicPeriod"/>
+            </a:pPr>
+            <a:r>
+              <a:rPr lang="en-US" dirty="0"/>
+              <a:t>Open </a:t>
+            </a:r>
+            <a:r>
+              <a:rPr lang="en-US" dirty="0">
+                <a:solidFill>
+                  <a:srgbClr val="0070C0"/>
+                </a:solidFill>
+                <a:latin typeface="Courier" pitchFamily="2" charset="0"/>
+              </a:rPr>
+              <a:t>templates/</a:t>
+            </a:r>
+            <a:r>
+              <a:rPr lang="en-US" dirty="0" err="1">
+                <a:solidFill>
+                  <a:srgbClr val="0070C0"/>
+                </a:solidFill>
+                <a:latin typeface="Courier" pitchFamily="2" charset="0"/>
+              </a:rPr>
+              <a:t>objectOrientedClass.m</a:t>
+            </a:r>
+            <a:endParaRPr lang="en-US" dirty="0">
+              <a:solidFill>
+                <a:srgbClr val="0070C0"/>
+              </a:solidFill>
+              <a:latin typeface="Courier" pitchFamily="2" charset="0"/>
+            </a:endParaRPr>
+          </a:p>
+          <a:p>
+            <a:pPr marL="457200" indent="-457200" algn="l">
+              <a:buAutoNum type="arabicPeriod"/>
+            </a:pPr>
+            <a:r>
+              <a:rPr lang="en-US" dirty="0"/>
+              <a:t>Rename it to something else (a class of object)</a:t>
+            </a:r>
+          </a:p>
+          <a:p>
+            <a:pPr marL="914400" lvl="1" indent="-457200" algn="l">
+              <a:buFont typeface="Arial" panose="020B0604020202020204" pitchFamily="34" charset="0"/>
+              <a:buChar char="•"/>
+            </a:pPr>
+            <a:r>
+              <a:rPr lang="en-US" dirty="0"/>
+              <a:t>e.g. </a:t>
+            </a:r>
+            <a:r>
+              <a:rPr lang="en-US" dirty="0" err="1">
+                <a:solidFill>
+                  <a:srgbClr val="0070C0"/>
+                </a:solidFill>
+                <a:latin typeface="Courier" pitchFamily="2" charset="0"/>
+              </a:rPr>
+              <a:t>barrel.m</a:t>
+            </a:r>
+            <a:endParaRPr lang="en-US" dirty="0"/>
+          </a:p>
+          <a:p>
+            <a:pPr marL="457200" indent="-457200" algn="l">
+              <a:buAutoNum type="arabicPeriod"/>
+            </a:pPr>
+            <a:r>
+              <a:rPr lang="en-US" dirty="0"/>
+              <a:t>Add two new properties to the class </a:t>
+            </a:r>
+          </a:p>
+          <a:p>
+            <a:pPr marL="914400" lvl="1" indent="-457200" algn="l">
+              <a:buFont typeface="Arial" panose="020B0604020202020204" pitchFamily="34" charset="0"/>
+              <a:buChar char="•"/>
+            </a:pPr>
+            <a:r>
+              <a:rPr lang="en-US" dirty="0"/>
+              <a:t>e.g. </a:t>
+            </a:r>
+            <a:r>
+              <a:rPr lang="en-US" dirty="0" err="1">
+                <a:solidFill>
+                  <a:srgbClr val="0070C0"/>
+                </a:solidFill>
+                <a:latin typeface="Courier" pitchFamily="2" charset="0"/>
+              </a:rPr>
+              <a:t>nMonkeys</a:t>
+            </a:r>
+            <a:endParaRPr lang="en-US" dirty="0"/>
+          </a:p>
+          <a:p>
+            <a:pPr marL="457200" indent="-457200" algn="l">
+              <a:buAutoNum type="arabicPeriod"/>
+            </a:pPr>
+            <a:r>
+              <a:rPr lang="en-US" dirty="0"/>
+              <a:t>Add a new dependent property, with a corresponding </a:t>
+            </a:r>
+            <a:r>
+              <a:rPr lang="en-US" dirty="0">
+                <a:solidFill>
+                  <a:srgbClr val="0070C0"/>
+                </a:solidFill>
+                <a:latin typeface="Courier" pitchFamily="2" charset="0"/>
+              </a:rPr>
+              <a:t>get</a:t>
+            </a:r>
+            <a:r>
+              <a:rPr lang="en-US" dirty="0"/>
+              <a:t> function</a:t>
+            </a:r>
+          </a:p>
+          <a:p>
+            <a:pPr marL="914400" lvl="1" indent="-457200" algn="l">
+              <a:buFont typeface="Arial" panose="020B0604020202020204" pitchFamily="34" charset="0"/>
+              <a:buChar char="•"/>
+            </a:pPr>
+            <a:r>
+              <a:rPr lang="en-US" dirty="0"/>
+              <a:t>e.g. </a:t>
+            </a:r>
+            <a:r>
+              <a:rPr lang="en-US" dirty="0" err="1">
+                <a:solidFill>
+                  <a:srgbClr val="0070C0"/>
+                </a:solidFill>
+                <a:latin typeface="Courier" pitchFamily="2" charset="0"/>
+              </a:rPr>
+              <a:t>isFull</a:t>
+            </a:r>
+            <a:endParaRPr lang="en-US" dirty="0"/>
+          </a:p>
+          <a:p>
+            <a:pPr marL="457200" indent="-457200" algn="l">
+              <a:buAutoNum type="arabicPeriod"/>
+            </a:pPr>
+            <a:r>
+              <a:rPr lang="en-US" dirty="0"/>
+              <a:t>Update constructor function</a:t>
+            </a:r>
+          </a:p>
+          <a:p>
+            <a:pPr marL="914400" lvl="1" indent="-457200" algn="l">
+              <a:buFont typeface="Arial" panose="020B0604020202020204" pitchFamily="34" charset="0"/>
+              <a:buChar char="•"/>
+            </a:pPr>
+            <a:r>
+              <a:rPr lang="en-US" dirty="0"/>
+              <a:t>e.g. </a:t>
+            </a:r>
+            <a:r>
+              <a:rPr lang="en-US" dirty="0">
+                <a:solidFill>
+                  <a:srgbClr val="0070C0"/>
+                </a:solidFill>
+                <a:latin typeface="Courier" pitchFamily="2" charset="0"/>
+              </a:rPr>
+              <a:t>function </a:t>
+            </a:r>
+            <a:r>
+              <a:rPr lang="en-US" dirty="0" err="1">
+                <a:solidFill>
+                  <a:srgbClr val="0070C0"/>
+                </a:solidFill>
+                <a:latin typeface="Courier" pitchFamily="2" charset="0"/>
+              </a:rPr>
+              <a:t>obj</a:t>
+            </a:r>
+            <a:r>
+              <a:rPr lang="en-US" dirty="0">
+                <a:solidFill>
+                  <a:srgbClr val="0070C0"/>
+                </a:solidFill>
+                <a:latin typeface="Courier" pitchFamily="2" charset="0"/>
+              </a:rPr>
+              <a:t> = barrel(nMonkeys2Start)</a:t>
+            </a:r>
+            <a:endParaRPr lang="en-US" dirty="0"/>
+          </a:p>
+          <a:p>
+            <a:pPr marL="457200" indent="-457200" algn="l">
+              <a:buAutoNum type="arabicPeriod"/>
+            </a:pPr>
+            <a:r>
+              <a:rPr lang="en-US" dirty="0"/>
+              <a:t>Write two new functions in the class</a:t>
+            </a:r>
+          </a:p>
+          <a:p>
+            <a:pPr marL="914400" lvl="1" indent="-457200" algn="l">
+              <a:buFont typeface="Arial" panose="020B0604020202020204" pitchFamily="34" charset="0"/>
+              <a:buChar char="•"/>
+            </a:pPr>
+            <a:r>
+              <a:rPr lang="en-US" dirty="0"/>
+              <a:t>e.g. </a:t>
+            </a:r>
+            <a:r>
+              <a:rPr lang="en-US" dirty="0">
+                <a:solidFill>
+                  <a:srgbClr val="0070C0"/>
+                </a:solidFill>
+                <a:latin typeface="Courier" pitchFamily="2" charset="0"/>
+              </a:rPr>
+              <a:t>function </a:t>
+            </a:r>
+            <a:r>
+              <a:rPr lang="en-US" dirty="0" err="1">
+                <a:solidFill>
+                  <a:srgbClr val="0070C0"/>
+                </a:solidFill>
+                <a:latin typeface="Courier" pitchFamily="2" charset="0"/>
+              </a:rPr>
+              <a:t>obj</a:t>
+            </a:r>
+            <a:r>
+              <a:rPr lang="en-US" dirty="0">
+                <a:solidFill>
+                  <a:srgbClr val="0070C0"/>
+                </a:solidFill>
+                <a:latin typeface="Courier" pitchFamily="2" charset="0"/>
+              </a:rPr>
+              <a:t> = </a:t>
+            </a:r>
+            <a:r>
+              <a:rPr lang="en-US" dirty="0" err="1">
+                <a:solidFill>
+                  <a:srgbClr val="0070C0"/>
+                </a:solidFill>
+                <a:latin typeface="Courier" pitchFamily="2" charset="0"/>
+              </a:rPr>
+              <a:t>addMonkeys</a:t>
+            </a:r>
+            <a:r>
+              <a:rPr lang="en-US" dirty="0">
+                <a:solidFill>
+                  <a:srgbClr val="0070C0"/>
+                </a:solidFill>
+                <a:latin typeface="Courier" pitchFamily="2" charset="0"/>
+              </a:rPr>
+              <a:t>(</a:t>
+            </a:r>
+            <a:r>
+              <a:rPr lang="en-US" dirty="0" err="1">
+                <a:solidFill>
+                  <a:srgbClr val="0070C0"/>
+                </a:solidFill>
+                <a:latin typeface="Courier" pitchFamily="2" charset="0"/>
+              </a:rPr>
+              <a:t>nMonkeysNew</a:t>
+            </a:r>
+            <a:r>
+              <a:rPr lang="en-US" dirty="0">
+                <a:solidFill>
+                  <a:srgbClr val="0070C0"/>
+                </a:solidFill>
+                <a:latin typeface="Courier" pitchFamily="2" charset="0"/>
+              </a:rPr>
+              <a:t>)</a:t>
+            </a:r>
+            <a:endParaRPr lang="en-US" dirty="0"/>
+          </a:p>
+          <a:p>
+            <a:pPr marL="457200" indent="-457200" algn="l">
+              <a:buAutoNum type="arabicPeriod"/>
+            </a:pPr>
+            <a:r>
+              <a:rPr lang="en-US" dirty="0"/>
+              <a:t>Write a driver file to create multiple instances of objects</a:t>
+            </a:r>
+          </a:p>
+          <a:p>
+            <a:pPr marL="914400" lvl="1" indent="-457200" algn="l">
+              <a:buFont typeface="Arial" panose="020B0604020202020204" pitchFamily="34" charset="0"/>
+              <a:buChar char="•"/>
+            </a:pPr>
+            <a:r>
+              <a:rPr lang="en-US" dirty="0"/>
+              <a:t>e.g. </a:t>
+            </a:r>
+            <a:r>
+              <a:rPr lang="en-US" dirty="0" err="1">
+                <a:solidFill>
+                  <a:srgbClr val="0070C0"/>
+                </a:solidFill>
+                <a:latin typeface="Courier" pitchFamily="2" charset="0"/>
+              </a:rPr>
+              <a:t>BarrelOfMonkeysExample.m</a:t>
+            </a:r>
+            <a:r>
+              <a:rPr lang="en-US" dirty="0"/>
+              <a:t> creates 2 barrels, one with 5 monkeys inside, the other is originally empty, so I fill it</a:t>
+            </a:r>
+            <a:endParaRPr lang="en-US" dirty="0">
+              <a:solidFill>
+                <a:srgbClr val="0070C0"/>
+              </a:solidFill>
+              <a:latin typeface="Courier" pitchFamily="2" charset="0"/>
+            </a:endParaRPr>
+          </a:p>
+        </p:txBody>
+      </p:sp>
+      <p:sp>
+        <p:nvSpPr>
+          <p:cNvPr id="5" name="Slide Number Placeholder 4">
+            <a:extLst>
+              <a:ext uri="{FF2B5EF4-FFF2-40B4-BE49-F238E27FC236}">
+                <a16:creationId xmlns:a16="http://schemas.microsoft.com/office/drawing/2014/main" id="{10231D7A-DD6D-0B43-94F8-716B648B9F87}"/>
+              </a:ext>
+            </a:extLst>
+          </p:cNvPr>
+          <p:cNvSpPr>
+            <a:spLocks noGrp="1"/>
+          </p:cNvSpPr>
+          <p:nvPr>
+            <p:ph type="sldNum" sz="quarter" idx="11"/>
+          </p:nvPr>
+        </p:nvSpPr>
+        <p:spPr>
+          <a:xfrm>
+            <a:off x="11786838" y="5771480"/>
+            <a:ext cx="405161" cy="365125"/>
+          </a:xfrm>
+        </p:spPr>
+        <p:txBody>
+          <a:bodyPr/>
+          <a:lstStyle/>
+          <a:p>
+            <a:fld id="{E62A57C8-5936-4048-93E2-2CC94939D132}" type="slidenum">
+              <a:rPr lang="en-US" smtClean="0"/>
+              <a:t>8</a:t>
+            </a:fld>
+            <a:endParaRPr lang="en-US"/>
+          </a:p>
+        </p:txBody>
+      </p:sp>
+    </p:spTree>
+    <p:extLst>
+      <p:ext uri="{BB962C8B-B14F-4D97-AF65-F5344CB8AC3E}">
+        <p14:creationId xmlns:p14="http://schemas.microsoft.com/office/powerpoint/2010/main" val="3020385554"/>
+      </p:ext>
+    </p:extLst>
+  </p:cSld>
+  <p:clrMapOvr>
+    <a:masterClrMapping/>
+  </p:clrMapOvr>
+</p:sld>
+</file>
+
+<file path=ppt/slides/slide9.xml><?xml version="1.0" encoding="utf-8"?>
+<p:sld xmlns:a="http://schemas.openxmlformats.org/drawingml/2006/main" xmlns:r="http://schemas.openxmlformats.org/officeDocument/2006/relationships" xmlns:p="http://schemas.openxmlformats.org/presentationml/2006/main">
+  <p:cSld>
+    <p:spTree>
+      <p:nvGrpSpPr>
+        <p:cNvPr id="1" name=""/>
+        <p:cNvGrpSpPr/>
+        <p:nvPr/>
+      </p:nvGrpSpPr>
+      <p:grpSpPr>
+        <a:xfrm>
+          <a:off x="0" y="0"/>
+          <a:ext cx="0" cy="0"/>
+          <a:chOff x="0" y="0"/>
+          <a:chExt cx="0" cy="0"/>
+        </a:xfrm>
+      </p:grpSpPr>
+      <p:sp>
+        <p:nvSpPr>
+          <p:cNvPr id="2" name="Title 1">
+            <a:extLst>
+              <a:ext uri="{FF2B5EF4-FFF2-40B4-BE49-F238E27FC236}">
+                <a16:creationId xmlns:a16="http://schemas.microsoft.com/office/drawing/2014/main" id="{F290A067-F07B-0046-8728-F04690F28C53}"/>
+              </a:ext>
+            </a:extLst>
+          </p:cNvPr>
+          <p:cNvSpPr>
+            <a:spLocks noGrp="1"/>
+          </p:cNvSpPr>
+          <p:nvPr>
+            <p:ph type="title"/>
+          </p:nvPr>
+        </p:nvSpPr>
+        <p:spPr>
+          <a:xfrm>
+            <a:off x="193638" y="476886"/>
+            <a:ext cx="11804724" cy="610234"/>
+          </a:xfrm>
+        </p:spPr>
+        <p:txBody>
+          <a:bodyPr>
+            <a:normAutofit/>
+          </a:bodyPr>
+          <a:lstStyle/>
+          <a:p>
+            <a:r>
+              <a:rPr lang="en-US" dirty="0"/>
+              <a:t>Example 5: MatLab object oriented programming with handle</a:t>
+            </a:r>
+          </a:p>
+        </p:txBody>
+      </p:sp>
+      <p:sp>
+        <p:nvSpPr>
+          <p:cNvPr id="3" name="Content Placeholder 2">
+            <a:extLst>
+              <a:ext uri="{FF2B5EF4-FFF2-40B4-BE49-F238E27FC236}">
+                <a16:creationId xmlns:a16="http://schemas.microsoft.com/office/drawing/2014/main" id="{2E58624B-8B68-A14B-BA0A-0183266D0F3F}"/>
+              </a:ext>
+            </a:extLst>
+          </p:cNvPr>
+          <p:cNvSpPr>
+            <a:spLocks noGrp="1"/>
+          </p:cNvSpPr>
+          <p:nvPr>
+            <p:ph idx="1"/>
+          </p:nvPr>
+        </p:nvSpPr>
+        <p:spPr>
+          <a:xfrm>
+            <a:off x="838200" y="1825624"/>
+            <a:ext cx="10515600" cy="5032375"/>
+          </a:xfrm>
+        </p:spPr>
+        <p:txBody>
+          <a:bodyPr>
+            <a:normAutofit/>
+          </a:bodyPr>
+          <a:lstStyle/>
+          <a:p>
+            <a:r>
+              <a:rPr lang="en-US" b="1" dirty="0"/>
+              <a:t>What is awesome:</a:t>
+            </a:r>
+            <a:endParaRPr lang="en-US" dirty="0"/>
+          </a:p>
+          <a:p>
+            <a:pPr marL="342900" indent="-342900">
+              <a:buFont typeface="Arial" panose="020B0604020202020204" pitchFamily="34" charset="0"/>
+              <a:buChar char="•"/>
+            </a:pPr>
+            <a:r>
+              <a:rPr lang="en-US" dirty="0"/>
+              <a:t>Creates </a:t>
+            </a:r>
+            <a:r>
+              <a:rPr lang="en-US" b="1" dirty="0"/>
+              <a:t>instances</a:t>
+            </a:r>
+            <a:r>
+              <a:rPr lang="en-US" b="1" i="1" dirty="0"/>
+              <a:t> </a:t>
+            </a:r>
+            <a:r>
+              <a:rPr lang="en-US" dirty="0"/>
+              <a:t>of </a:t>
+            </a:r>
+            <a:r>
+              <a:rPr lang="en-US" i="1" dirty="0"/>
+              <a:t>objects</a:t>
+            </a:r>
+            <a:r>
+              <a:rPr lang="en-US" dirty="0"/>
+              <a:t>, with specific </a:t>
+            </a:r>
+            <a:r>
+              <a:rPr lang="en-US" b="1" dirty="0"/>
+              <a:t>properties </a:t>
+            </a:r>
+            <a:r>
+              <a:rPr lang="en-US" dirty="0"/>
+              <a:t>and </a:t>
+            </a:r>
+            <a:r>
+              <a:rPr lang="en-US" b="1" dirty="0"/>
+              <a:t>functions</a:t>
+            </a:r>
+            <a:r>
+              <a:rPr lang="en-US" dirty="0"/>
+              <a:t>.</a:t>
+            </a:r>
+          </a:p>
+          <a:p>
+            <a:pPr marL="342900" indent="-342900">
+              <a:buFont typeface="Arial" panose="020B0604020202020204" pitchFamily="34" charset="0"/>
+              <a:buChar char="•"/>
+            </a:pPr>
+            <a:r>
+              <a:rPr lang="en-US" dirty="0"/>
+              <a:t>Can have constraints on setting properties</a:t>
+            </a:r>
+          </a:p>
+          <a:p>
+            <a:pPr marL="342900" indent="-342900">
+              <a:buFont typeface="Arial" panose="020B0604020202020204" pitchFamily="34" charset="0"/>
+              <a:buChar char="•"/>
+            </a:pPr>
+            <a:r>
+              <a:rPr lang="en-US" dirty="0"/>
+              <a:t>Properties can be dependent on other properties</a:t>
+            </a:r>
+          </a:p>
+          <a:p>
+            <a:pPr marL="342900" indent="-342900">
+              <a:buFont typeface="Arial" panose="020B0604020202020204" pitchFamily="34" charset="0"/>
+              <a:buChar char="•"/>
+            </a:pPr>
+            <a:r>
+              <a:rPr lang="en-US" dirty="0"/>
+              <a:t>“objects of objects”</a:t>
+            </a:r>
+          </a:p>
+          <a:p>
+            <a:pPr marL="342900" indent="-342900">
+              <a:buFont typeface="Arial" panose="020B0604020202020204" pitchFamily="34" charset="0"/>
+              <a:buChar char="•"/>
+            </a:pPr>
+            <a:r>
+              <a:rPr lang="en-US" dirty="0"/>
+              <a:t>Object properties are saved automatically whenever they change</a:t>
+            </a:r>
+          </a:p>
+          <a:p>
+            <a:pPr marL="342900" indent="-342900">
+              <a:buFont typeface="Arial" panose="020B0604020202020204" pitchFamily="34" charset="0"/>
+              <a:buChar char="•"/>
+            </a:pPr>
+            <a:r>
+              <a:rPr lang="en-US" dirty="0"/>
+              <a:t>Keeping track of objects is intuitive</a:t>
+            </a:r>
+          </a:p>
+          <a:p>
+            <a:pPr marL="342900" indent="-342900">
+              <a:buFont typeface="Arial" panose="020B0604020202020204" pitchFamily="34" charset="0"/>
+              <a:buChar char="•"/>
+            </a:pPr>
+            <a:endParaRPr lang="en-US" dirty="0"/>
+          </a:p>
+          <a:p>
+            <a:r>
+              <a:rPr lang="en-US" b="1" dirty="0"/>
+              <a:t>What is not awesome:</a:t>
+            </a:r>
+          </a:p>
+          <a:p>
+            <a:pPr marL="342900" indent="-342900">
+              <a:buFont typeface="Arial" panose="020B0604020202020204" pitchFamily="34" charset="0"/>
+              <a:buChar char="•"/>
+            </a:pPr>
+            <a:r>
+              <a:rPr lang="en-US" dirty="0"/>
+              <a:t>Might not be ideal for all workflows. Often, static classes are the best place to start.</a:t>
+            </a:r>
+          </a:p>
+          <a:p>
+            <a:pPr marL="342900" indent="-342900">
+              <a:buFont typeface="Arial" panose="020B0604020202020204" pitchFamily="34" charset="0"/>
+              <a:buChar char="•"/>
+            </a:pPr>
+            <a:endParaRPr lang="en-US" i="1" dirty="0"/>
+          </a:p>
+          <a:p>
+            <a:pPr marL="342900" indent="-342900">
+              <a:buFont typeface="Arial" panose="020B0604020202020204" pitchFamily="34" charset="0"/>
+              <a:buChar char="•"/>
+            </a:pPr>
+            <a:endParaRPr lang="en-US" dirty="0"/>
+          </a:p>
+        </p:txBody>
+      </p:sp>
+      <p:sp>
+        <p:nvSpPr>
+          <p:cNvPr id="4" name="Slide Number Placeholder 3">
+            <a:extLst>
+              <a:ext uri="{FF2B5EF4-FFF2-40B4-BE49-F238E27FC236}">
+                <a16:creationId xmlns:a16="http://schemas.microsoft.com/office/drawing/2014/main" id="{4A11F5FE-2285-774F-980F-237EE5879233}"/>
+              </a:ext>
+            </a:extLst>
+          </p:cNvPr>
+          <p:cNvSpPr>
+            <a:spLocks noGrp="1"/>
+          </p:cNvSpPr>
+          <p:nvPr>
+            <p:ph type="sldNum" sz="quarter" idx="10"/>
+          </p:nvPr>
+        </p:nvSpPr>
+        <p:spPr/>
+        <p:txBody>
+          <a:bodyPr/>
+          <a:lstStyle/>
+          <a:p>
+            <a:fld id="{E62A57C8-5936-4048-93E2-2CC94939D132}" type="slidenum">
+              <a:rPr lang="en-US" smtClean="0"/>
+              <a:t>9</a:t>
             </a:fld>
             <a:endParaRPr lang="en-US"/>
           </a:p>

</xml_diff>